<commit_message>
Some tweaks to the programs and documentation
</commit_message>
<xml_diff>
--- a/tools/docs/TF2017-FlowChart.pptx
+++ b/tools/docs/TF2017-FlowChart.pptx
@@ -243,7 +243,7 @@
           <a:p>
             <a:fld id="{19CCC5F2-62C6-B34D-BF0A-B8E9C77D6D52}" type="datetimeFigureOut">
               <a:rPr lang="en-US" smtClean="0"/>
-              <a:t>1/27/17</a:t>
+              <a:t>3/10/17</a:t>
             </a:fld>
             <a:endParaRPr lang="en-US"/>
           </a:p>
@@ -413,7 +413,7 @@
           <a:p>
             <a:fld id="{19CCC5F2-62C6-B34D-BF0A-B8E9C77D6D52}" type="datetimeFigureOut">
               <a:rPr lang="en-US" smtClean="0"/>
-              <a:t>1/27/17</a:t>
+              <a:t>3/10/17</a:t>
             </a:fld>
             <a:endParaRPr lang="en-US"/>
           </a:p>
@@ -593,7 +593,7 @@
           <a:p>
             <a:fld id="{19CCC5F2-62C6-B34D-BF0A-B8E9C77D6D52}" type="datetimeFigureOut">
               <a:rPr lang="en-US" smtClean="0"/>
-              <a:t>1/27/17</a:t>
+              <a:t>3/10/17</a:t>
             </a:fld>
             <a:endParaRPr lang="en-US"/>
           </a:p>
@@ -763,7 +763,7 @@
           <a:p>
             <a:fld id="{19CCC5F2-62C6-B34D-BF0A-B8E9C77D6D52}" type="datetimeFigureOut">
               <a:rPr lang="en-US" smtClean="0"/>
-              <a:t>1/27/17</a:t>
+              <a:t>3/10/17</a:t>
             </a:fld>
             <a:endParaRPr lang="en-US"/>
           </a:p>
@@ -1009,7 +1009,7 @@
           <a:p>
             <a:fld id="{19CCC5F2-62C6-B34D-BF0A-B8E9C77D6D52}" type="datetimeFigureOut">
               <a:rPr lang="en-US" smtClean="0"/>
-              <a:t>1/27/17</a:t>
+              <a:t>3/10/17</a:t>
             </a:fld>
             <a:endParaRPr lang="en-US"/>
           </a:p>
@@ -1241,7 +1241,7 @@
           <a:p>
             <a:fld id="{19CCC5F2-62C6-B34D-BF0A-B8E9C77D6D52}" type="datetimeFigureOut">
               <a:rPr lang="en-US" smtClean="0"/>
-              <a:t>1/27/17</a:t>
+              <a:t>3/10/17</a:t>
             </a:fld>
             <a:endParaRPr lang="en-US"/>
           </a:p>
@@ -1608,7 +1608,7 @@
           <a:p>
             <a:fld id="{19CCC5F2-62C6-B34D-BF0A-B8E9C77D6D52}" type="datetimeFigureOut">
               <a:rPr lang="en-US" smtClean="0"/>
-              <a:t>1/27/17</a:t>
+              <a:t>3/10/17</a:t>
             </a:fld>
             <a:endParaRPr lang="en-US"/>
           </a:p>
@@ -1726,7 +1726,7 @@
           <a:p>
             <a:fld id="{19CCC5F2-62C6-B34D-BF0A-B8E9C77D6D52}" type="datetimeFigureOut">
               <a:rPr lang="en-US" smtClean="0"/>
-              <a:t>1/27/17</a:t>
+              <a:t>3/10/17</a:t>
             </a:fld>
             <a:endParaRPr lang="en-US"/>
           </a:p>
@@ -1821,7 +1821,7 @@
           <a:p>
             <a:fld id="{19CCC5F2-62C6-B34D-BF0A-B8E9C77D6D52}" type="datetimeFigureOut">
               <a:rPr lang="en-US" smtClean="0"/>
-              <a:t>1/27/17</a:t>
+              <a:t>3/10/17</a:t>
             </a:fld>
             <a:endParaRPr lang="en-US"/>
           </a:p>
@@ -2098,7 +2098,7 @@
           <a:p>
             <a:fld id="{19CCC5F2-62C6-B34D-BF0A-B8E9C77D6D52}" type="datetimeFigureOut">
               <a:rPr lang="en-US" smtClean="0"/>
-              <a:t>1/27/17</a:t>
+              <a:t>3/10/17</a:t>
             </a:fld>
             <a:endParaRPr lang="en-US"/>
           </a:p>
@@ -2351,7 +2351,7 @@
           <a:p>
             <a:fld id="{19CCC5F2-62C6-B34D-BF0A-B8E9C77D6D52}" type="datetimeFigureOut">
               <a:rPr lang="en-US" smtClean="0"/>
-              <a:t>1/27/17</a:t>
+              <a:t>3/10/17</a:t>
             </a:fld>
             <a:endParaRPr lang="en-US"/>
           </a:p>
@@ -2564,7 +2564,7 @@
           <a:p>
             <a:fld id="{19CCC5F2-62C6-B34D-BF0A-B8E9C77D6D52}" type="datetimeFigureOut">
               <a:rPr lang="en-US" smtClean="0"/>
-              <a:t>1/27/17</a:t>
+              <a:t>3/10/17</a:t>
             </a:fld>
             <a:endParaRPr lang="en-US"/>
           </a:p>
@@ -3051,11 +3051,7 @@
             <a:pPr algn="ctr"/>
             <a:r>
               <a:rPr lang="en-US" dirty="0" smtClean="0"/>
-              <a:t>Gather data and make a </a:t>
-            </a:r>
-            <a:r>
-              <a:rPr lang="en-US" dirty="0" smtClean="0"/>
-              <a:t>decision</a:t>
+              <a:t>Gather data and make a decision</a:t>
             </a:r>
             <a:endParaRPr lang="en-US" dirty="0"/>
           </a:p>
@@ -3415,7 +3411,15 @@
             <a:pPr algn="ctr"/>
             <a:r>
               <a:rPr lang="en-US" dirty="0" smtClean="0"/>
-              <a:t>Zoom in or out according to the data received</a:t>
+              <a:t>Zoom </a:t>
+            </a:r>
+            <a:r>
+              <a:rPr lang="en-US" dirty="0" smtClean="0"/>
+              <a:t>in/out or reset </a:t>
+            </a:r>
+            <a:r>
+              <a:rPr lang="en-US" dirty="0" smtClean="0"/>
+              <a:t>according to the data received</a:t>
             </a:r>
             <a:endParaRPr lang="en-US" dirty="0"/>
           </a:p>

</xml_diff>